<commit_message>
added hopfield net stuff
</commit_message>
<xml_diff>
--- a/PNIBootcamp2025/Week 2/friday/networks.pptx
+++ b/PNIBootcamp2025/Week 2/friday/networks.pptx
@@ -806,7 +806,7 @@
   <p:cSld>
     <p:spTree>
       <p:nvGrpSpPr>
-        <p:cNvPr id="143" name="Shape 143"/>
+        <p:cNvPr id="144" name="Shape 144"/>
         <p:cNvGrpSpPr/>
         <p:nvPr/>
       </p:nvGrpSpPr>
@@ -820,7 +820,7 @@
       </p:grpSpPr>
       <p:sp>
         <p:nvSpPr>
-          <p:cNvPr id="144" name="Google Shape;144;g362222dcf7d_0_3:notes"/>
+          <p:cNvPr id="145" name="Google Shape;145;g362222dcf7d_0_3:notes"/>
           <p:cNvSpPr/>
           <p:nvPr>
             <p:ph idx="2" type="sldImg"/>
@@ -855,7 +855,7 @@
       </p:sp>
       <p:sp>
         <p:nvSpPr>
-          <p:cNvPr id="145" name="Google Shape;145;g362222dcf7d_0_3:notes"/>
+          <p:cNvPr id="146" name="Google Shape;146;g362222dcf7d_0_3:notes"/>
           <p:cNvSpPr txBox="1"/>
           <p:nvPr>
             <p:ph idx="1" type="body"/>
@@ -905,7 +905,7 @@
   <p:cSld>
     <p:spTree>
       <p:nvGrpSpPr>
-        <p:cNvPr id="149" name="Shape 149"/>
+        <p:cNvPr id="150" name="Shape 150"/>
         <p:cNvGrpSpPr/>
         <p:nvPr/>
       </p:nvGrpSpPr>
@@ -919,7 +919,7 @@
       </p:grpSpPr>
       <p:sp>
         <p:nvSpPr>
-          <p:cNvPr id="150" name="Google Shape;150;g336bce55fa4_0_78:notes"/>
+          <p:cNvPr id="151" name="Google Shape;151;g336bce55fa4_0_78:notes"/>
           <p:cNvSpPr/>
           <p:nvPr>
             <p:ph idx="2" type="sldImg"/>
@@ -954,7 +954,7 @@
       </p:sp>
       <p:sp>
         <p:nvSpPr>
-          <p:cNvPr id="151" name="Google Shape;151;g336bce55fa4_0_78:notes"/>
+          <p:cNvPr id="152" name="Google Shape;152;g336bce55fa4_0_78:notes"/>
           <p:cNvSpPr txBox="1"/>
           <p:nvPr>
             <p:ph idx="1" type="body"/>
@@ -1004,7 +1004,7 @@
   <p:cSld>
     <p:spTree>
       <p:nvGrpSpPr>
-        <p:cNvPr id="164" name="Shape 164"/>
+        <p:cNvPr id="165" name="Shape 165"/>
         <p:cNvGrpSpPr/>
         <p:nvPr/>
       </p:nvGrpSpPr>
@@ -1018,7 +1018,7 @@
       </p:grpSpPr>
       <p:sp>
         <p:nvSpPr>
-          <p:cNvPr id="165" name="Google Shape;165;g371570ebf7d_0_3:notes"/>
+          <p:cNvPr id="166" name="Google Shape;166;g371570ebf7d_0_3:notes"/>
           <p:cNvSpPr/>
           <p:nvPr>
             <p:ph idx="2" type="sldImg"/>
@@ -1053,7 +1053,7 @@
       </p:sp>
       <p:sp>
         <p:nvSpPr>
-          <p:cNvPr id="166" name="Google Shape;166;g371570ebf7d_0_3:notes"/>
+          <p:cNvPr id="167" name="Google Shape;167;g371570ebf7d_0_3:notes"/>
           <p:cNvSpPr txBox="1"/>
           <p:nvPr>
             <p:ph idx="1" type="body"/>
@@ -1103,7 +1103,7 @@
   <p:cSld>
     <p:spTree>
       <p:nvGrpSpPr>
-        <p:cNvPr id="171" name="Shape 171"/>
+        <p:cNvPr id="172" name="Shape 172"/>
         <p:cNvGrpSpPr/>
         <p:nvPr/>
       </p:nvGrpSpPr>
@@ -1117,7 +1117,7 @@
       </p:grpSpPr>
       <p:sp>
         <p:nvSpPr>
-          <p:cNvPr id="172" name="Google Shape;172;g33cf9185298_0_6:notes"/>
+          <p:cNvPr id="173" name="Google Shape;173;g33cf9185298_0_6:notes"/>
           <p:cNvSpPr/>
           <p:nvPr>
             <p:ph idx="2" type="sldImg"/>
@@ -1152,7 +1152,7 @@
       </p:sp>
       <p:sp>
         <p:nvSpPr>
-          <p:cNvPr id="173" name="Google Shape;173;g33cf9185298_0_6:notes"/>
+          <p:cNvPr id="174" name="Google Shape;174;g33cf9185298_0_6:notes"/>
           <p:cNvSpPr txBox="1"/>
           <p:nvPr>
             <p:ph idx="1" type="body"/>
@@ -1202,7 +1202,7 @@
   <p:cSld>
     <p:spTree>
       <p:nvGrpSpPr>
-        <p:cNvPr id="181" name="Shape 181"/>
+        <p:cNvPr id="182" name="Shape 182"/>
         <p:cNvGrpSpPr/>
         <p:nvPr/>
       </p:nvGrpSpPr>
@@ -1216,7 +1216,7 @@
       </p:grpSpPr>
       <p:sp>
         <p:nvSpPr>
-          <p:cNvPr id="182" name="Google Shape;182;g33cf9185298_0_23:notes"/>
+          <p:cNvPr id="183" name="Google Shape;183;g33cf9185298_0_23:notes"/>
           <p:cNvSpPr/>
           <p:nvPr>
             <p:ph idx="2" type="sldImg"/>
@@ -1251,7 +1251,7 @@
       </p:sp>
       <p:sp>
         <p:nvSpPr>
-          <p:cNvPr id="183" name="Google Shape;183;g33cf9185298_0_23:notes"/>
+          <p:cNvPr id="184" name="Google Shape;184;g33cf9185298_0_23:notes"/>
           <p:cNvSpPr txBox="1"/>
           <p:nvPr>
             <p:ph idx="1" type="body"/>
@@ -1301,7 +1301,7 @@
   <p:cSld>
     <p:spTree>
       <p:nvGrpSpPr>
-        <p:cNvPr id="189" name="Shape 189"/>
+        <p:cNvPr id="190" name="Shape 190"/>
         <p:cNvGrpSpPr/>
         <p:nvPr/>
       </p:nvGrpSpPr>
@@ -1315,7 +1315,7 @@
       </p:grpSpPr>
       <p:sp>
         <p:nvSpPr>
-          <p:cNvPr id="190" name="Google Shape;190;g344f13c615c_0_0:notes"/>
+          <p:cNvPr id="191" name="Google Shape;191;g344f13c615c_0_0:notes"/>
           <p:cNvSpPr/>
           <p:nvPr>
             <p:ph idx="2" type="sldImg"/>
@@ -1350,7 +1350,7 @@
       </p:sp>
       <p:sp>
         <p:nvSpPr>
-          <p:cNvPr id="191" name="Google Shape;191;g344f13c615c_0_0:notes"/>
+          <p:cNvPr id="192" name="Google Shape;192;g344f13c615c_0_0:notes"/>
           <p:cNvSpPr txBox="1"/>
           <p:nvPr>
             <p:ph idx="1" type="body"/>
@@ -1400,7 +1400,7 @@
   <p:cSld>
     <p:spTree>
       <p:nvGrpSpPr>
-        <p:cNvPr id="196" name="Shape 196"/>
+        <p:cNvPr id="197" name="Shape 197"/>
         <p:cNvGrpSpPr/>
         <p:nvPr/>
       </p:nvGrpSpPr>
@@ -1414,7 +1414,7 @@
       </p:grpSpPr>
       <p:sp>
         <p:nvSpPr>
-          <p:cNvPr id="197" name="Google Shape;197;g344f13c615c_0_6:notes"/>
+          <p:cNvPr id="198" name="Google Shape;198;g344f13c615c_0_6:notes"/>
           <p:cNvSpPr/>
           <p:nvPr>
             <p:ph idx="2" type="sldImg"/>
@@ -1449,7 +1449,7 @@
       </p:sp>
       <p:sp>
         <p:nvSpPr>
-          <p:cNvPr id="198" name="Google Shape;198;g344f13c615c_0_6:notes"/>
+          <p:cNvPr id="199" name="Google Shape;199;g344f13c615c_0_6:notes"/>
           <p:cNvSpPr txBox="1"/>
           <p:nvPr>
             <p:ph idx="1" type="body"/>
@@ -1499,7 +1499,7 @@
   <p:cSld>
     <p:spTree>
       <p:nvGrpSpPr>
-        <p:cNvPr id="202" name="Shape 202"/>
+        <p:cNvPr id="204" name="Shape 204"/>
         <p:cNvGrpSpPr/>
         <p:nvPr/>
       </p:nvGrpSpPr>
@@ -1513,7 +1513,7 @@
       </p:grpSpPr>
       <p:sp>
         <p:nvSpPr>
-          <p:cNvPr id="203" name="Google Shape;203;g344f13c615c_0_11:notes"/>
+          <p:cNvPr id="205" name="Google Shape;205;g344f13c615c_0_11:notes"/>
           <p:cNvSpPr/>
           <p:nvPr>
             <p:ph idx="2" type="sldImg"/>
@@ -1548,7 +1548,7 @@
       </p:sp>
       <p:sp>
         <p:nvSpPr>
-          <p:cNvPr id="204" name="Google Shape;204;g344f13c615c_0_11:notes"/>
+          <p:cNvPr id="206" name="Google Shape;206;g344f13c615c_0_11:notes"/>
           <p:cNvSpPr txBox="1"/>
           <p:nvPr>
             <p:ph idx="1" type="body"/>
@@ -1994,7 +1994,7 @@
   <p:cSld>
     <p:spTree>
       <p:nvGrpSpPr>
-        <p:cNvPr id="91" name="Shape 91"/>
+        <p:cNvPr id="92" name="Shape 92"/>
         <p:cNvGrpSpPr/>
         <p:nvPr/>
       </p:nvGrpSpPr>
@@ -2008,7 +2008,7 @@
       </p:grpSpPr>
       <p:sp>
         <p:nvSpPr>
-          <p:cNvPr id="92" name="Google Shape;92;g336bce55fa4_0_33:notes"/>
+          <p:cNvPr id="93" name="Google Shape;93;g336bce55fa4_0_33:notes"/>
           <p:cNvSpPr/>
           <p:nvPr>
             <p:ph idx="2" type="sldImg"/>
@@ -2043,7 +2043,7 @@
       </p:sp>
       <p:sp>
         <p:nvSpPr>
-          <p:cNvPr id="93" name="Google Shape;93;g336bce55fa4_0_33:notes"/>
+          <p:cNvPr id="94" name="Google Shape;94;g336bce55fa4_0_33:notes"/>
           <p:cNvSpPr txBox="1"/>
           <p:nvPr>
             <p:ph idx="1" type="body"/>
@@ -2093,7 +2093,7 @@
   <p:cSld>
     <p:spTree>
       <p:nvGrpSpPr>
-        <p:cNvPr id="103" name="Shape 103"/>
+        <p:cNvPr id="104" name="Shape 104"/>
         <p:cNvGrpSpPr/>
         <p:nvPr/>
       </p:nvGrpSpPr>
@@ -2107,7 +2107,7 @@
       </p:grpSpPr>
       <p:sp>
         <p:nvSpPr>
-          <p:cNvPr id="104" name="Google Shape;104;g336bce55fa4_0_44:notes"/>
+          <p:cNvPr id="105" name="Google Shape;105;g336bce55fa4_0_44:notes"/>
           <p:cNvSpPr/>
           <p:nvPr>
             <p:ph idx="2" type="sldImg"/>
@@ -2142,7 +2142,7 @@
       </p:sp>
       <p:sp>
         <p:nvSpPr>
-          <p:cNvPr id="105" name="Google Shape;105;g336bce55fa4_0_44:notes"/>
+          <p:cNvPr id="106" name="Google Shape;106;g336bce55fa4_0_44:notes"/>
           <p:cNvSpPr txBox="1"/>
           <p:nvPr>
             <p:ph idx="1" type="body"/>
@@ -2192,7 +2192,7 @@
   <p:cSld>
     <p:spTree>
       <p:nvGrpSpPr>
-        <p:cNvPr id="115" name="Shape 115"/>
+        <p:cNvPr id="116" name="Shape 116"/>
         <p:cNvGrpSpPr/>
         <p:nvPr/>
       </p:nvGrpSpPr>
@@ -2206,7 +2206,7 @@
       </p:grpSpPr>
       <p:sp>
         <p:nvSpPr>
-          <p:cNvPr id="116" name="Google Shape;116;g336bce55fa4_0_57:notes"/>
+          <p:cNvPr id="117" name="Google Shape;117;g336bce55fa4_0_57:notes"/>
           <p:cNvSpPr/>
           <p:nvPr>
             <p:ph idx="2" type="sldImg"/>
@@ -2241,7 +2241,7 @@
       </p:sp>
       <p:sp>
         <p:nvSpPr>
-          <p:cNvPr id="117" name="Google Shape;117;g336bce55fa4_0_57:notes"/>
+          <p:cNvPr id="118" name="Google Shape;118;g336bce55fa4_0_57:notes"/>
           <p:cNvSpPr txBox="1"/>
           <p:nvPr>
             <p:ph idx="1" type="body"/>
@@ -2291,7 +2291,7 @@
   <p:cSld>
     <p:spTree>
       <p:nvGrpSpPr>
-        <p:cNvPr id="132" name="Shape 132"/>
+        <p:cNvPr id="133" name="Shape 133"/>
         <p:cNvGrpSpPr/>
         <p:nvPr/>
       </p:nvGrpSpPr>
@@ -2305,7 +2305,7 @@
       </p:grpSpPr>
       <p:sp>
         <p:nvSpPr>
-          <p:cNvPr id="133" name="Google Shape;133;g336bce55fa4_0_83:notes"/>
+          <p:cNvPr id="134" name="Google Shape;134;g336bce55fa4_0_83:notes"/>
           <p:cNvSpPr/>
           <p:nvPr>
             <p:ph idx="2" type="sldImg"/>
@@ -2340,7 +2340,7 @@
       </p:sp>
       <p:sp>
         <p:nvSpPr>
-          <p:cNvPr id="134" name="Google Shape;134;g336bce55fa4_0_83:notes"/>
+          <p:cNvPr id="135" name="Google Shape;135;g336bce55fa4_0_83:notes"/>
           <p:cNvSpPr txBox="1"/>
           <p:nvPr>
             <p:ph idx="1" type="body"/>
@@ -7144,7 +7144,7 @@
   <p:cSld>
     <p:spTree>
       <p:nvGrpSpPr>
-        <p:cNvPr id="146" name="Shape 146"/>
+        <p:cNvPr id="147" name="Shape 147"/>
         <p:cNvGrpSpPr/>
         <p:nvPr/>
       </p:nvGrpSpPr>
@@ -7158,7 +7158,7 @@
       </p:grpSpPr>
       <p:sp>
         <p:nvSpPr>
-          <p:cNvPr id="147" name="Google Shape;147;p22"/>
+          <p:cNvPr id="148" name="Google Shape;148;p22"/>
           <p:cNvSpPr txBox="1"/>
           <p:nvPr>
             <p:ph type="title"/>
@@ -7198,7 +7198,7 @@
       </p:sp>
       <p:sp>
         <p:nvSpPr>
-          <p:cNvPr id="148" name="Google Shape;148;p22"/>
+          <p:cNvPr id="149" name="Google Shape;149;p22"/>
           <p:cNvSpPr txBox="1"/>
           <p:nvPr>
             <p:ph idx="1" type="body"/>
@@ -7248,7 +7248,7 @@
   <p:cSld>
     <p:spTree>
       <p:nvGrpSpPr>
-        <p:cNvPr id="152" name="Shape 152"/>
+        <p:cNvPr id="153" name="Shape 153"/>
         <p:cNvGrpSpPr/>
         <p:nvPr/>
       </p:nvGrpSpPr>
@@ -7262,7 +7262,7 @@
       </p:grpSpPr>
       <p:sp>
         <p:nvSpPr>
-          <p:cNvPr id="153" name="Google Shape;153;p23"/>
+          <p:cNvPr id="154" name="Google Shape;154;p23"/>
           <p:cNvSpPr txBox="1"/>
           <p:nvPr>
             <p:ph type="title"/>
@@ -7302,7 +7302,7 @@
       </p:sp>
       <p:sp>
         <p:nvSpPr>
-          <p:cNvPr id="154" name="Google Shape;154;p23"/>
+          <p:cNvPr id="155" name="Google Shape;155;p23"/>
           <p:cNvSpPr txBox="1"/>
           <p:nvPr>
             <p:ph idx="1" type="body"/>
@@ -7526,7 +7526,7 @@
       </p:sp>
       <p:pic>
         <p:nvPicPr>
-          <p:cNvPr id="155" name="Google Shape;155;p23" title="rnn.jpg"/>
+          <p:cNvPr id="156" name="Google Shape;156;p23" title="rnn.jpg"/>
           <p:cNvPicPr preferRelativeResize="0"/>
           <p:nvPr/>
         </p:nvPicPr>
@@ -7554,7 +7554,7 @@
       </p:pic>
       <p:sp>
         <p:nvSpPr>
-          <p:cNvPr id="156" name="Google Shape;156;p23"/>
+          <p:cNvPr id="157" name="Google Shape;157;p23"/>
           <p:cNvSpPr txBox="1"/>
           <p:nvPr/>
         </p:nvSpPr>
@@ -7604,7 +7604,7 @@
       </p:sp>
       <p:cxnSp>
         <p:nvCxnSpPr>
-          <p:cNvPr id="157" name="Google Shape;157;p23"/>
+          <p:cNvPr id="158" name="Google Shape;158;p23"/>
           <p:cNvCxnSpPr/>
           <p:nvPr/>
         </p:nvCxnSpPr>
@@ -7630,7 +7630,7 @@
       </p:cxnSp>
       <p:sp>
         <p:nvSpPr>
-          <p:cNvPr id="158" name="Google Shape;158;p23"/>
+          <p:cNvPr id="159" name="Google Shape;159;p23"/>
           <p:cNvSpPr txBox="1"/>
           <p:nvPr>
             <p:ph type="title"/>
@@ -7670,7 +7670,7 @@
       </p:sp>
       <p:pic>
         <p:nvPicPr>
-          <p:cNvPr id="159" name="Google Shape;159;p23"/>
+          <p:cNvPr id="160" name="Google Shape;160;p23"/>
           <p:cNvPicPr preferRelativeResize="0"/>
           <p:nvPr/>
         </p:nvPicPr>
@@ -7697,7 +7697,7 @@
       </p:pic>
       <p:sp>
         <p:nvSpPr>
-          <p:cNvPr id="160" name="Google Shape;160;p23"/>
+          <p:cNvPr id="161" name="Google Shape;161;p23"/>
           <p:cNvSpPr txBox="1"/>
           <p:nvPr/>
         </p:nvSpPr>
@@ -7747,7 +7747,7 @@
       </p:sp>
       <p:pic>
         <p:nvPicPr>
-          <p:cNvPr id="161" name="Google Shape;161;p23" title="Screenshot 2025-06-15 at 11.00.50 PM.png"/>
+          <p:cNvPr id="162" name="Google Shape;162;p23" title="Screenshot 2025-06-15 at 11.00.50 PM.png"/>
           <p:cNvPicPr preferRelativeResize="0"/>
           <p:nvPr/>
         </p:nvPicPr>
@@ -7775,7 +7775,7 @@
       </p:pic>
       <p:sp>
         <p:nvSpPr>
-          <p:cNvPr id="162" name="Google Shape;162;p23"/>
+          <p:cNvPr id="163" name="Google Shape;163;p23"/>
           <p:cNvSpPr/>
           <p:nvPr/>
         </p:nvSpPr>
@@ -7825,7 +7825,7 @@
       </p:sp>
       <p:sp>
         <p:nvSpPr>
-          <p:cNvPr id="163" name="Google Shape;163;p23"/>
+          <p:cNvPr id="164" name="Google Shape;164;p23"/>
           <p:cNvSpPr txBox="1"/>
           <p:nvPr/>
         </p:nvSpPr>
@@ -7886,7 +7886,7 @@
   <p:cSld>
     <p:spTree>
       <p:nvGrpSpPr>
-        <p:cNvPr id="167" name="Shape 167"/>
+        <p:cNvPr id="168" name="Shape 168"/>
         <p:cNvGrpSpPr/>
         <p:nvPr/>
       </p:nvGrpSpPr>
@@ -7900,7 +7900,7 @@
       </p:grpSpPr>
       <p:pic>
         <p:nvPicPr>
-          <p:cNvPr id="168" name="Google Shape;168;p24"/>
+          <p:cNvPr id="169" name="Google Shape;169;p24"/>
           <p:cNvPicPr preferRelativeResize="0"/>
           <p:nvPr/>
         </p:nvPicPr>
@@ -7928,7 +7928,7 @@
       </p:pic>
       <p:sp>
         <p:nvSpPr>
-          <p:cNvPr id="169" name="Google Shape;169;p24"/>
+          <p:cNvPr id="170" name="Google Shape;170;p24"/>
           <p:cNvSpPr txBox="1"/>
           <p:nvPr/>
         </p:nvSpPr>
@@ -7996,7 +7996,7 @@
       </p:sp>
       <p:sp>
         <p:nvSpPr>
-          <p:cNvPr id="170" name="Google Shape;170;p24"/>
+          <p:cNvPr id="171" name="Google Shape;171;p24"/>
           <p:cNvSpPr txBox="1"/>
           <p:nvPr/>
         </p:nvSpPr>
@@ -8202,7 +8202,7 @@
   <p:cSld>
     <p:spTree>
       <p:nvGrpSpPr>
-        <p:cNvPr id="174" name="Shape 174"/>
+        <p:cNvPr id="175" name="Shape 175"/>
         <p:cNvGrpSpPr/>
         <p:nvPr/>
       </p:nvGrpSpPr>
@@ -8216,7 +8216,7 @@
       </p:grpSpPr>
       <p:sp>
         <p:nvSpPr>
-          <p:cNvPr id="175" name="Google Shape;175;p25"/>
+          <p:cNvPr id="176" name="Google Shape;176;p25"/>
           <p:cNvSpPr txBox="1"/>
           <p:nvPr>
             <p:ph type="title"/>
@@ -8256,7 +8256,7 @@
       </p:sp>
       <p:sp>
         <p:nvSpPr>
-          <p:cNvPr id="176" name="Google Shape;176;p25"/>
+          <p:cNvPr id="177" name="Google Shape;177;p25"/>
           <p:cNvSpPr txBox="1"/>
           <p:nvPr>
             <p:ph idx="1" type="body"/>
@@ -8299,7 +8299,7 @@
       </p:sp>
       <p:pic>
         <p:nvPicPr>
-          <p:cNvPr id="177" name="Google Shape;177;p25" title="Screenshot 2025-06-15 at 11.05.18 PM.png"/>
+          <p:cNvPr id="178" name="Google Shape;178;p25" title="Screenshot 2025-06-15 at 11.05.18 PM.png"/>
           <p:cNvPicPr preferRelativeResize="0"/>
           <p:nvPr/>
         </p:nvPicPr>
@@ -8327,7 +8327,7 @@
       </p:pic>
       <p:sp>
         <p:nvSpPr>
-          <p:cNvPr id="178" name="Google Shape;178;p25"/>
+          <p:cNvPr id="179" name="Google Shape;179;p25"/>
           <p:cNvSpPr/>
           <p:nvPr/>
         </p:nvSpPr>
@@ -8370,7 +8370,7 @@
       </p:sp>
       <p:sp>
         <p:nvSpPr>
-          <p:cNvPr id="179" name="Google Shape;179;p25"/>
+          <p:cNvPr id="180" name="Google Shape;180;p25"/>
           <p:cNvSpPr txBox="1"/>
           <p:nvPr/>
         </p:nvSpPr>
@@ -8420,7 +8420,7 @@
       </p:sp>
       <p:sp>
         <p:nvSpPr>
-          <p:cNvPr id="180" name="Google Shape;180;p25"/>
+          <p:cNvPr id="181" name="Google Shape;181;p25"/>
           <p:cNvSpPr txBox="1"/>
           <p:nvPr/>
         </p:nvSpPr>
@@ -8481,7 +8481,7 @@
   <p:cSld>
     <p:spTree>
       <p:nvGrpSpPr>
-        <p:cNvPr id="184" name="Shape 184"/>
+        <p:cNvPr id="185" name="Shape 185"/>
         <p:cNvGrpSpPr/>
         <p:nvPr/>
       </p:nvGrpSpPr>
@@ -8495,7 +8495,7 @@
       </p:grpSpPr>
       <p:sp>
         <p:nvSpPr>
-          <p:cNvPr id="185" name="Google Shape;185;p26"/>
+          <p:cNvPr id="186" name="Google Shape;186;p26"/>
           <p:cNvSpPr txBox="1"/>
           <p:nvPr>
             <p:ph type="title"/>
@@ -8535,7 +8535,7 @@
       </p:sp>
       <p:pic>
         <p:nvPicPr>
-          <p:cNvPr id="186" name="Google Shape;186;p26"/>
+          <p:cNvPr id="187" name="Google Shape;187;p26"/>
           <p:cNvPicPr preferRelativeResize="0"/>
           <p:nvPr/>
         </p:nvPicPr>
@@ -8563,7 +8563,7 @@
       </p:pic>
       <p:sp>
         <p:nvSpPr>
-          <p:cNvPr id="187" name="Google Shape;187;p26"/>
+          <p:cNvPr id="188" name="Google Shape;188;p26"/>
           <p:cNvSpPr txBox="1"/>
           <p:nvPr/>
         </p:nvSpPr>
@@ -8613,7 +8613,7 @@
       </p:sp>
       <p:sp>
         <p:nvSpPr>
-          <p:cNvPr id="188" name="Google Shape;188;p26"/>
+          <p:cNvPr id="189" name="Google Shape;189;p26"/>
           <p:cNvSpPr txBox="1"/>
           <p:nvPr/>
         </p:nvSpPr>
@@ -8674,7 +8674,7 @@
   <p:cSld>
     <p:spTree>
       <p:nvGrpSpPr>
-        <p:cNvPr id="192" name="Shape 192"/>
+        <p:cNvPr id="193" name="Shape 193"/>
         <p:cNvGrpSpPr/>
         <p:nvPr/>
       </p:nvGrpSpPr>
@@ -8688,7 +8688,7 @@
       </p:grpSpPr>
       <p:sp>
         <p:nvSpPr>
-          <p:cNvPr id="193" name="Google Shape;193;p27"/>
+          <p:cNvPr id="194" name="Google Shape;194;p27"/>
           <p:cNvSpPr txBox="1"/>
           <p:nvPr>
             <p:ph type="title"/>
@@ -8728,7 +8728,7 @@
       </p:sp>
       <p:sp>
         <p:nvSpPr>
-          <p:cNvPr id="194" name="Google Shape;194;p27"/>
+          <p:cNvPr id="195" name="Google Shape;195;p27"/>
           <p:cNvSpPr txBox="1"/>
           <p:nvPr>
             <p:ph idx="1" type="body"/>
@@ -8829,7 +8829,7 @@
       </p:sp>
       <p:pic>
         <p:nvPicPr>
-          <p:cNvPr id="195" name="Google Shape;195;p27"/>
+          <p:cNvPr id="196" name="Google Shape;196;p27"/>
           <p:cNvPicPr preferRelativeResize="0"/>
           <p:nvPr/>
         </p:nvPicPr>
@@ -8842,7 +8842,7 @@
         </p:blipFill>
         <p:spPr>
           <a:xfrm>
-            <a:off x="7474500" y="4055075"/>
+            <a:off x="7474500" y="4083975"/>
             <a:ext cx="1669500" cy="1002350"/>
           </a:xfrm>
           <a:prstGeom prst="rect">
@@ -8867,7 +8867,7 @@
   <p:cSld>
     <p:spTree>
       <p:nvGrpSpPr>
-        <p:cNvPr id="199" name="Shape 199"/>
+        <p:cNvPr id="200" name="Shape 200"/>
         <p:cNvGrpSpPr/>
         <p:nvPr/>
       </p:nvGrpSpPr>
@@ -8881,7 +8881,7 @@
       </p:grpSpPr>
       <p:sp>
         <p:nvSpPr>
-          <p:cNvPr id="200" name="Google Shape;200;p28"/>
+          <p:cNvPr id="201" name="Google Shape;201;p28"/>
           <p:cNvSpPr txBox="1"/>
           <p:nvPr>
             <p:ph type="title"/>
@@ -8921,7 +8921,7 @@
       </p:sp>
       <p:sp>
         <p:nvSpPr>
-          <p:cNvPr id="201" name="Google Shape;201;p28"/>
+          <p:cNvPr id="202" name="Google Shape;202;p28"/>
           <p:cNvSpPr txBox="1"/>
           <p:nvPr>
             <p:ph idx="1" type="body"/>
@@ -8969,7 +8969,7 @@
             </a:pPr>
             <a:r>
               <a:rPr lang="en"/>
-              <a:t>It turns out that there is a rather efficient and elegant algorithm for computing these gradients across layers of an MLP called backpropagation, so called because it “propagates” the loss function iteratively “back” across layers until we can take a full step in the right direction according to the gradient.</a:t>
+              <a:t>It turns out that there is a rather efficient and elegant algorithm for computing these gradients across layers of an MLP called backpropagation, so called because it “propagates” the loss function iteratively “back” across layers until we take a full step in the right direction according to the gradient.</a:t>
             </a:r>
             <a:endParaRPr/>
           </a:p>
@@ -9004,6 +9004,33 @@
           </a:p>
         </p:txBody>
       </p:sp>
+      <p:pic>
+        <p:nvPicPr>
+          <p:cNvPr id="203" name="Google Shape;203;p28"/>
+          <p:cNvPicPr preferRelativeResize="0"/>
+          <p:nvPr/>
+        </p:nvPicPr>
+        <p:blipFill rotWithShape="1">
+          <a:blip r:embed="rId4">
+            <a:alphaModFix/>
+          </a:blip>
+          <a:srcRect b="0" l="15483" r="0" t="16576"/>
+          <a:stretch/>
+        </p:blipFill>
+        <p:spPr>
+          <a:xfrm>
+            <a:off x="4970175" y="150125"/>
+            <a:ext cx="1669500" cy="1002350"/>
+          </a:xfrm>
+          <a:prstGeom prst="rect">
+            <a:avLst/>
+          </a:prstGeom>
+          <a:noFill/>
+          <a:ln>
+            <a:noFill/>
+          </a:ln>
+        </p:spPr>
+      </p:pic>
     </p:spTree>
   </p:cSld>
   <p:clrMapOvr>
@@ -9017,7 +9044,7 @@
   <p:cSld>
     <p:spTree>
       <p:nvGrpSpPr>
-        <p:cNvPr id="205" name="Shape 205"/>
+        <p:cNvPr id="207" name="Shape 207"/>
         <p:cNvGrpSpPr/>
         <p:nvPr/>
       </p:nvGrpSpPr>
@@ -9031,7 +9058,7 @@
       </p:grpSpPr>
       <p:sp>
         <p:nvSpPr>
-          <p:cNvPr id="206" name="Google Shape;206;p29"/>
+          <p:cNvPr id="208" name="Google Shape;208;p29"/>
           <p:cNvSpPr txBox="1"/>
           <p:nvPr>
             <p:ph type="title"/>
@@ -9071,7 +9098,7 @@
       </p:sp>
       <p:sp>
         <p:nvSpPr>
-          <p:cNvPr id="207" name="Google Shape;207;p29"/>
+          <p:cNvPr id="209" name="Google Shape;209;p29"/>
           <p:cNvSpPr txBox="1"/>
           <p:nvPr>
             <p:ph idx="1" type="body"/>
@@ -9139,7 +9166,7 @@
             </a:r>
             <a:r>
               <a:rPr lang="en"/>
-              <a:t>ome parameters. If the function is y=2x then x’s gradient is 2. If the function is a massive neural network, the gradient is a huge matrix with very complex structure.</a:t>
+              <a:t>ome parameters. If the function is f(x)=2x then x’s gradient is 2. If the function is a massive neural network, the gradient is a huge matrix with very complex structure.</a:t>
             </a:r>
             <a:endParaRPr/>
           </a:p>
@@ -9163,7 +9190,7 @@
             </a:r>
             <a:r>
               <a:rPr lang="en"/>
-              <a:t> arbitrary function over its inputs. Even if that function is my 1000 line garbage function.</a:t>
+              <a:t> arbitrary function over its inputs. Even if that function is my 10000 lines of garbage.</a:t>
             </a:r>
             <a:endParaRPr/>
           </a:p>
@@ -9555,8 +9582,13 @@
               <a:buNone/>
             </a:pPr>
             <a:r>
-              <a:rPr lang="en"/>
-              <a:t>Computational abilities as useful representations of variables</a:t>
+              <a:rPr lang="en" u="sng">
+                <a:solidFill>
+                  <a:schemeClr val="hlink"/>
+                </a:solidFill>
+                <a:hlinkClick r:id="rId3"/>
+              </a:rPr>
+              <a:t>Computations as useful representations of variables</a:t>
             </a:r>
             <a:endParaRPr/>
           </a:p>
@@ -9656,7 +9688,7 @@
           <p:nvPr/>
         </p:nvPicPr>
         <p:blipFill>
-          <a:blip r:embed="rId3">
+          <a:blip r:embed="rId4">
             <a:alphaModFix/>
           </a:blip>
           <a:stretch>
@@ -9826,7 +9858,7 @@
             </a:pPr>
             <a:r>
               <a:rPr lang="en"/>
-              <a:t>Imagine we have an animal that sees everything in 8x8 pixels. Each neuron in its retina responds 1-to-1 with a given pixel, so we have 64 neurons.</a:t>
+              <a:t>Imagine we have an animal that sees everything in 8x8 pixels. Each neuron in its retina responds one-to-one with a given pixel, so we have 64 neurons.</a:t>
             </a:r>
             <a:endParaRPr/>
           </a:p>
@@ -9897,7 +9929,7 @@
         </p:nvSpPr>
         <p:spPr>
           <a:xfrm>
-            <a:off x="712650" y="3399950"/>
+            <a:off x="433425" y="3399950"/>
             <a:ext cx="4671600" cy="1599000"/>
           </a:xfrm>
           <a:prstGeom prst="rect">
@@ -9929,7 +9961,7 @@
                   <a:schemeClr val="dk2"/>
                 </a:solidFill>
               </a:rPr>
-              <a:t>These neurons each have connections to each other, they are fully connected. We’ll call this matrix T</a:t>
+              <a:t>These neurons each have connections to each other; they are fully connected. We’ll call this matrix T</a:t>
             </a:r>
             <a:r>
               <a:rPr baseline="-25000" lang="en" sz="1800">
@@ -10151,6 +10183,77 @@
           </a:ln>
         </p:spPr>
       </p:pic>
+      <p:sp>
+        <p:nvSpPr>
+          <p:cNvPr id="91" name="Google Shape;91;p17"/>
+          <p:cNvSpPr txBox="1"/>
+          <p:nvPr/>
+        </p:nvSpPr>
+        <p:spPr>
+          <a:xfrm>
+            <a:off x="5384250" y="3823700"/>
+            <a:ext cx="664500" cy="269700"/>
+          </a:xfrm>
+          <a:prstGeom prst="rect">
+            <a:avLst/>
+          </a:prstGeom>
+          <a:noFill/>
+          <a:ln>
+            <a:noFill/>
+          </a:ln>
+        </p:spPr>
+        <p:txBody>
+          <a:bodyPr anchorCtr="0" anchor="t" bIns="91425" lIns="91425" spcFirstLastPara="1" rIns="91425" wrap="square" tIns="91425">
+            <a:noAutofit/>
+          </a:bodyPr>
+          <a:lstStyle/>
+          <a:p>
+            <a:pPr indent="0" lvl="0" marL="0" rtl="0" algn="l">
+              <a:spcBef>
+                <a:spcPts val="0"/>
+              </a:spcBef>
+              <a:spcAft>
+                <a:spcPts val="0"/>
+              </a:spcAft>
+              <a:buClr>
+                <a:schemeClr val="dk1"/>
+              </a:buClr>
+              <a:buSzPts val="1100"/>
+              <a:buFont typeface="Arial"/>
+              <a:buNone/>
+            </a:pPr>
+            <a:r>
+              <a:rPr lang="en" sz="1800">
+                <a:solidFill>
+                  <a:schemeClr val="dk2"/>
+                </a:solidFill>
+              </a:rPr>
+              <a:t>T</a:t>
+            </a:r>
+            <a:r>
+              <a:rPr baseline="-25000" lang="en" sz="1800">
+                <a:solidFill>
+                  <a:schemeClr val="dk2"/>
+                </a:solidFill>
+              </a:rPr>
+              <a:t>ij</a:t>
+            </a:r>
+            <a:r>
+              <a:rPr lang="en" sz="1800">
+                <a:solidFill>
+                  <a:schemeClr val="dk2"/>
+                </a:solidFill>
+              </a:rPr>
+              <a:t>:</a:t>
+            </a:r>
+            <a:endParaRPr sz="1800">
+              <a:solidFill>
+                <a:schemeClr val="dk2"/>
+              </a:solidFill>
+            </a:endParaRPr>
+          </a:p>
+        </p:txBody>
+      </p:sp>
     </p:spTree>
   </p:cSld>
   <p:clrMapOvr>
@@ -10164,7 +10267,7 @@
   <p:cSld>
     <p:spTree>
       <p:nvGrpSpPr>
-        <p:cNvPr id="94" name="Shape 94"/>
+        <p:cNvPr id="95" name="Shape 95"/>
         <p:cNvGrpSpPr/>
         <p:nvPr/>
       </p:nvGrpSpPr>
@@ -10178,7 +10281,7 @@
       </p:grpSpPr>
       <p:sp>
         <p:nvSpPr>
-          <p:cNvPr id="95" name="Google Shape;95;p18"/>
+          <p:cNvPr id="96" name="Google Shape;96;p18"/>
           <p:cNvSpPr txBox="1"/>
           <p:nvPr>
             <p:ph type="title"/>
@@ -10218,7 +10321,7 @@
       </p:sp>
       <p:sp>
         <p:nvSpPr>
-          <p:cNvPr id="96" name="Google Shape;96;p18"/>
+          <p:cNvPr id="97" name="Google Shape;97;p18"/>
           <p:cNvSpPr txBox="1"/>
           <p:nvPr>
             <p:ph idx="1" type="body"/>
@@ -10266,7 +10369,7 @@
       </p:sp>
       <p:pic>
         <p:nvPicPr>
-          <p:cNvPr id="97" name="Google Shape;97;p18"/>
+          <p:cNvPr id="98" name="Google Shape;98;p18"/>
           <p:cNvPicPr preferRelativeResize="0"/>
           <p:nvPr/>
         </p:nvPicPr>
@@ -10294,7 +10397,7 @@
       </p:pic>
       <p:sp>
         <p:nvSpPr>
-          <p:cNvPr id="98" name="Google Shape;98;p18"/>
+          <p:cNvPr id="99" name="Google Shape;99;p18"/>
           <p:cNvSpPr txBox="1"/>
           <p:nvPr/>
         </p:nvSpPr>
@@ -10360,7 +10463,7 @@
       </p:sp>
       <p:pic>
         <p:nvPicPr>
-          <p:cNvPr id="99" name="Google Shape;99;p18"/>
+          <p:cNvPr id="100" name="Google Shape;100;p18"/>
           <p:cNvPicPr preferRelativeResize="0"/>
           <p:nvPr/>
         </p:nvPicPr>
@@ -10388,7 +10491,7 @@
       </p:pic>
       <p:sp>
         <p:nvSpPr>
-          <p:cNvPr id="100" name="Google Shape;100;p18"/>
+          <p:cNvPr id="101" name="Google Shape;101;p18"/>
           <p:cNvSpPr txBox="1"/>
           <p:nvPr/>
         </p:nvSpPr>
@@ -10435,72 +10538,6 @@
                 </a:solidFill>
               </a:rPr>
               <a:t>s</a:t>
-            </a:r>
-            <a:endParaRPr sz="1800">
-              <a:solidFill>
-                <a:schemeClr val="dk2"/>
-              </a:solidFill>
-            </a:endParaRPr>
-          </a:p>
-        </p:txBody>
-      </p:sp>
-      <p:sp>
-        <p:nvSpPr>
-          <p:cNvPr id="101" name="Google Shape;101;p18"/>
-          <p:cNvSpPr txBox="1"/>
-          <p:nvPr/>
-        </p:nvSpPr>
-        <p:spPr>
-          <a:xfrm>
-            <a:off x="4758225" y="3778950"/>
-            <a:ext cx="3149700" cy="356400"/>
-          </a:xfrm>
-          <a:prstGeom prst="rect">
-            <a:avLst/>
-          </a:prstGeom>
-          <a:noFill/>
-          <a:ln>
-            <a:noFill/>
-          </a:ln>
-        </p:spPr>
-        <p:txBody>
-          <a:bodyPr anchorCtr="0" anchor="t" bIns="91425" lIns="91425" spcFirstLastPara="1" rIns="91425" wrap="square" tIns="91425">
-            <a:noAutofit/>
-          </a:bodyPr>
-          <a:lstStyle/>
-          <a:p>
-            <a:pPr indent="0" lvl="0" marL="0" rtl="0" algn="l">
-              <a:spcBef>
-                <a:spcPts val="0"/>
-              </a:spcBef>
-              <a:spcAft>
-                <a:spcPts val="0"/>
-              </a:spcAft>
-              <a:buNone/>
-            </a:pPr>
-            <a:r>
-              <a:rPr lang="en" sz="1800">
-                <a:solidFill>
-                  <a:schemeClr val="dk2"/>
-                </a:solidFill>
-              </a:rPr>
-              <a:t>But set T</a:t>
-            </a:r>
-            <a:r>
-              <a:rPr baseline="-25000" lang="en" sz="1800">
-                <a:solidFill>
-                  <a:schemeClr val="dk2"/>
-                </a:solidFill>
-              </a:rPr>
-              <a:t>ii</a:t>
-            </a:r>
-            <a:r>
-              <a:rPr lang="en" sz="1800">
-                <a:solidFill>
-                  <a:schemeClr val="dk2"/>
-                </a:solidFill>
-              </a:rPr>
-              <a:t> to 0</a:t>
             </a:r>
             <a:endParaRPr sz="1800">
               <a:solidFill>
@@ -10513,6 +10550,72 @@
       <p:sp>
         <p:nvSpPr>
           <p:cNvPr id="102" name="Google Shape;102;p18"/>
+          <p:cNvSpPr txBox="1"/>
+          <p:nvPr/>
+        </p:nvSpPr>
+        <p:spPr>
+          <a:xfrm>
+            <a:off x="4758225" y="3778950"/>
+            <a:ext cx="3149700" cy="356400"/>
+          </a:xfrm>
+          <a:prstGeom prst="rect">
+            <a:avLst/>
+          </a:prstGeom>
+          <a:noFill/>
+          <a:ln>
+            <a:noFill/>
+          </a:ln>
+        </p:spPr>
+        <p:txBody>
+          <a:bodyPr anchorCtr="0" anchor="t" bIns="91425" lIns="91425" spcFirstLastPara="1" rIns="91425" wrap="square" tIns="91425">
+            <a:noAutofit/>
+          </a:bodyPr>
+          <a:lstStyle/>
+          <a:p>
+            <a:pPr indent="0" lvl="0" marL="0" rtl="0" algn="l">
+              <a:spcBef>
+                <a:spcPts val="0"/>
+              </a:spcBef>
+              <a:spcAft>
+                <a:spcPts val="0"/>
+              </a:spcAft>
+              <a:buNone/>
+            </a:pPr>
+            <a:r>
+              <a:rPr lang="en" sz="1800">
+                <a:solidFill>
+                  <a:schemeClr val="dk2"/>
+                </a:solidFill>
+              </a:rPr>
+              <a:t>But set T</a:t>
+            </a:r>
+            <a:r>
+              <a:rPr baseline="-25000" lang="en" sz="1800">
+                <a:solidFill>
+                  <a:schemeClr val="dk2"/>
+                </a:solidFill>
+              </a:rPr>
+              <a:t>ii</a:t>
+            </a:r>
+            <a:r>
+              <a:rPr lang="en" sz="1800">
+                <a:solidFill>
+                  <a:schemeClr val="dk2"/>
+                </a:solidFill>
+              </a:rPr>
+              <a:t> to 0</a:t>
+            </a:r>
+            <a:endParaRPr sz="1800">
+              <a:solidFill>
+                <a:schemeClr val="dk2"/>
+              </a:solidFill>
+            </a:endParaRPr>
+          </a:p>
+        </p:txBody>
+      </p:sp>
+      <p:sp>
+        <p:nvSpPr>
+          <p:cNvPr id="103" name="Google Shape;103;p18"/>
           <p:cNvSpPr txBox="1"/>
           <p:nvPr/>
         </p:nvSpPr>
@@ -10573,7 +10676,7 @@
   <p:cSld>
     <p:spTree>
       <p:nvGrpSpPr>
-        <p:cNvPr id="106" name="Shape 106"/>
+        <p:cNvPr id="107" name="Shape 107"/>
         <p:cNvGrpSpPr/>
         <p:nvPr/>
       </p:nvGrpSpPr>
@@ -10587,7 +10690,7 @@
       </p:grpSpPr>
       <p:sp>
         <p:nvSpPr>
-          <p:cNvPr id="107" name="Google Shape;107;p19"/>
+          <p:cNvPr id="108" name="Google Shape;108;p19"/>
           <p:cNvSpPr txBox="1"/>
           <p:nvPr>
             <p:ph type="title"/>
@@ -10626,7 +10729,7 @@
       </p:sp>
       <p:sp>
         <p:nvSpPr>
-          <p:cNvPr id="108" name="Google Shape;108;p19"/>
+          <p:cNvPr id="109" name="Google Shape;109;p19"/>
           <p:cNvSpPr txBox="1"/>
           <p:nvPr>
             <p:ph idx="1" type="body"/>
@@ -10665,7 +10768,7 @@
       </p:sp>
       <p:pic>
         <p:nvPicPr>
-          <p:cNvPr id="109" name="Google Shape;109;p19" title="0f67e5cd-019b-4034-9318-777eb3cb4ca3.png"/>
+          <p:cNvPr id="110" name="Google Shape;110;p19" title="0f67e5cd-019b-4034-9318-777eb3cb4ca3.png"/>
           <p:cNvPicPr preferRelativeResize="0"/>
           <p:nvPr/>
         </p:nvPicPr>
@@ -10693,7 +10796,7 @@
       </p:pic>
       <p:pic>
         <p:nvPicPr>
-          <p:cNvPr id="110" name="Google Shape;110;p19" title="de30fca5-c7aa-43fd-a85a-03e83d439dde.png"/>
+          <p:cNvPr id="111" name="Google Shape;111;p19" title="de30fca5-c7aa-43fd-a85a-03e83d439dde.png"/>
           <p:cNvPicPr preferRelativeResize="0"/>
           <p:nvPr/>
         </p:nvPicPr>
@@ -10721,7 +10824,7 @@
       </p:pic>
       <p:pic>
         <p:nvPicPr>
-          <p:cNvPr id="111" name="Google Shape;111;p19" title="0328c14a-22fc-4f9d-acdd-a0c0737d7b3c.png"/>
+          <p:cNvPr id="112" name="Google Shape;112;p19" title="0328c14a-22fc-4f9d-acdd-a0c0737d7b3c.png"/>
           <p:cNvPicPr preferRelativeResize="0"/>
           <p:nvPr/>
         </p:nvPicPr>
@@ -10749,7 +10852,7 @@
       </p:pic>
       <p:pic>
         <p:nvPicPr>
-          <p:cNvPr id="112" name="Google Shape;112;p19" title="32b6343a-74c8-4278-be56-d93787ffe4f4.png"/>
+          <p:cNvPr id="113" name="Google Shape;113;p19" title="32b6343a-74c8-4278-be56-d93787ffe4f4.png"/>
           <p:cNvPicPr preferRelativeResize="0"/>
           <p:nvPr/>
         </p:nvPicPr>
@@ -10777,10 +10880,10 @@
       </p:pic>
       <p:cxnSp>
         <p:nvCxnSpPr>
-          <p:cNvPr id="113" name="Google Shape;113;p19"/>
+          <p:cNvPr id="114" name="Google Shape;114;p19"/>
           <p:cNvCxnSpPr>
-            <a:stCxn id="109" idx="3"/>
-            <a:endCxn id="112" idx="1"/>
+            <a:stCxn id="110" idx="3"/>
+            <a:endCxn id="113" idx="1"/>
           </p:cNvCxnSpPr>
           <p:nvPr/>
         </p:nvCxnSpPr>
@@ -10806,10 +10909,10 @@
       </p:cxnSp>
       <p:cxnSp>
         <p:nvCxnSpPr>
-          <p:cNvPr id="114" name="Google Shape;114;p19"/>
+          <p:cNvPr id="115" name="Google Shape;115;p19"/>
           <p:cNvCxnSpPr>
-            <a:stCxn id="110" idx="3"/>
-            <a:endCxn id="111" idx="1"/>
+            <a:stCxn id="111" idx="3"/>
+            <a:endCxn id="112" idx="1"/>
           </p:cNvCxnSpPr>
           <p:nvPr/>
         </p:nvCxnSpPr>
@@ -10846,7 +10949,7 @@
   <p:cSld>
     <p:spTree>
       <p:nvGrpSpPr>
-        <p:cNvPr id="118" name="Shape 118"/>
+        <p:cNvPr id="119" name="Shape 119"/>
         <p:cNvGrpSpPr/>
         <p:nvPr/>
       </p:nvGrpSpPr>
@@ -10860,7 +10963,7 @@
       </p:grpSpPr>
       <p:pic>
         <p:nvPicPr>
-          <p:cNvPr id="119" name="Google Shape;119;p20" title="32b6343a-74c8-4278-be56-d93787ffe4f4.png"/>
+          <p:cNvPr id="120" name="Google Shape;120;p20" title="32b6343a-74c8-4278-be56-d93787ffe4f4.png"/>
           <p:cNvPicPr preferRelativeResize="0"/>
           <p:nvPr/>
         </p:nvPicPr>
@@ -10888,7 +10991,7 @@
       </p:pic>
       <p:pic>
         <p:nvPicPr>
-          <p:cNvPr id="120" name="Google Shape;120;p20" title="0328c14a-22fc-4f9d-acdd-a0c0737d7b3c.png"/>
+          <p:cNvPr id="121" name="Google Shape;121;p20" title="0328c14a-22fc-4f9d-acdd-a0c0737d7b3c.png"/>
           <p:cNvPicPr preferRelativeResize="0"/>
           <p:nvPr/>
         </p:nvPicPr>
@@ -10916,7 +11019,7 @@
       </p:pic>
       <p:pic>
         <p:nvPicPr>
-          <p:cNvPr id="121" name="Google Shape;121;p20" title="722c9df9-f62a-4060-851b-1d319f44fbab.png"/>
+          <p:cNvPr id="122" name="Google Shape;122;p20" title="722c9df9-f62a-4060-851b-1d319f44fbab.png"/>
           <p:cNvPicPr preferRelativeResize="0"/>
           <p:nvPr/>
         </p:nvPicPr>
@@ -10944,9 +11047,9 @@
       </p:pic>
       <p:cxnSp>
         <p:nvCxnSpPr>
-          <p:cNvPr id="122" name="Google Shape;122;p20"/>
+          <p:cNvPr id="123" name="Google Shape;123;p20"/>
           <p:cNvCxnSpPr>
-            <a:stCxn id="119" idx="2"/>
+            <a:stCxn id="120" idx="2"/>
           </p:cNvCxnSpPr>
           <p:nvPr/>
         </p:nvCxnSpPr>
@@ -10972,9 +11075,9 @@
       </p:cxnSp>
       <p:cxnSp>
         <p:nvCxnSpPr>
-          <p:cNvPr id="123" name="Google Shape;123;p20"/>
+          <p:cNvPr id="124" name="Google Shape;124;p20"/>
           <p:cNvCxnSpPr>
-            <a:stCxn id="120" idx="2"/>
+            <a:stCxn id="121" idx="2"/>
           </p:cNvCxnSpPr>
           <p:nvPr/>
         </p:nvCxnSpPr>
@@ -11000,7 +11103,7 @@
       </p:cxnSp>
       <p:pic>
         <p:nvPicPr>
-          <p:cNvPr id="124" name="Google Shape;124;p20"/>
+          <p:cNvPr id="125" name="Google Shape;125;p20"/>
           <p:cNvPicPr preferRelativeResize="0"/>
           <p:nvPr/>
         </p:nvPicPr>
@@ -11028,7 +11131,7 @@
       </p:pic>
       <p:pic>
         <p:nvPicPr>
-          <p:cNvPr id="125" name="Google Shape;125;p20"/>
+          <p:cNvPr id="126" name="Google Shape;126;p20"/>
           <p:cNvPicPr preferRelativeResize="0"/>
           <p:nvPr/>
         </p:nvPicPr>
@@ -11056,9 +11159,9 @@
       </p:pic>
       <p:cxnSp>
         <p:nvCxnSpPr>
-          <p:cNvPr id="126" name="Google Shape;126;p20"/>
+          <p:cNvPr id="127" name="Google Shape;127;p20"/>
           <p:cNvCxnSpPr>
-            <a:stCxn id="127" idx="2"/>
+            <a:stCxn id="128" idx="2"/>
           </p:cNvCxnSpPr>
           <p:nvPr/>
         </p:nvCxnSpPr>
@@ -11084,7 +11187,7 @@
       </p:cxnSp>
       <p:sp>
         <p:nvSpPr>
-          <p:cNvPr id="128" name="Google Shape;128;p20"/>
+          <p:cNvPr id="129" name="Google Shape;129;p20"/>
           <p:cNvSpPr txBox="1"/>
           <p:nvPr/>
         </p:nvSpPr>
@@ -11134,7 +11237,7 @@
       </p:sp>
       <p:sp>
         <p:nvSpPr>
-          <p:cNvPr id="129" name="Google Shape;129;p20"/>
+          <p:cNvPr id="130" name="Google Shape;130;p20"/>
           <p:cNvSpPr/>
           <p:nvPr/>
         </p:nvSpPr>
@@ -11189,7 +11292,7 @@
       </p:sp>
       <p:cxnSp>
         <p:nvCxnSpPr>
-          <p:cNvPr id="130" name="Google Shape;130;p20"/>
+          <p:cNvPr id="131" name="Google Shape;131;p20"/>
           <p:cNvCxnSpPr/>
           <p:nvPr/>
         </p:nvCxnSpPr>
@@ -11215,7 +11318,7 @@
       </p:cxnSp>
       <p:pic>
         <p:nvPicPr>
-          <p:cNvPr id="131" name="Google Shape;131;p20" title="Figure 8.png"/>
+          <p:cNvPr id="132" name="Google Shape;132;p20" title="Figure 8.png"/>
           <p:cNvPicPr preferRelativeResize="0"/>
           <p:nvPr/>
         </p:nvPicPr>
@@ -11254,7 +11357,7 @@
   <p:cSld>
     <p:spTree>
       <p:nvGrpSpPr>
-        <p:cNvPr id="135" name="Shape 135"/>
+        <p:cNvPr id="136" name="Shape 136"/>
         <p:cNvGrpSpPr/>
         <p:nvPr/>
       </p:nvGrpSpPr>
@@ -11268,7 +11371,7 @@
       </p:grpSpPr>
       <p:sp>
         <p:nvSpPr>
-          <p:cNvPr id="136" name="Google Shape;136;p21"/>
+          <p:cNvPr id="137" name="Google Shape;137;p21"/>
           <p:cNvSpPr txBox="1"/>
           <p:nvPr>
             <p:ph type="title"/>
@@ -11299,7 +11402,12 @@
               <a:buNone/>
             </a:pPr>
             <a:r>
-              <a:rPr lang="en"/>
+              <a:rPr lang="en" u="sng">
+                <a:solidFill>
+                  <a:schemeClr val="hlink"/>
+                </a:solidFill>
+                <a:hlinkClick r:id="rId3"/>
+              </a:rPr>
               <a:t>Continuous values?</a:t>
             </a:r>
             <a:endParaRPr/>
@@ -11308,7 +11416,7 @@
       </p:sp>
       <p:sp>
         <p:nvSpPr>
-          <p:cNvPr id="137" name="Google Shape;137;p21"/>
+          <p:cNvPr id="138" name="Google Shape;138;p21"/>
           <p:cNvSpPr txBox="1"/>
           <p:nvPr>
             <p:ph idx="1" type="body"/>
@@ -11380,85 +11488,7 @@
       </p:sp>
       <p:pic>
         <p:nvPicPr>
-          <p:cNvPr id="138" name="Google Shape;138;p21"/>
-          <p:cNvPicPr preferRelativeResize="0"/>
-          <p:nvPr/>
-        </p:nvPicPr>
-        <p:blipFill>
-          <a:blip r:embed="rId3">
-            <a:alphaModFix/>
-          </a:blip>
-          <a:stretch>
-            <a:fillRect/>
-          </a:stretch>
-        </p:blipFill>
-        <p:spPr>
-          <a:xfrm>
-            <a:off x="228325" y="972800"/>
-            <a:ext cx="3287701" cy="4064725"/>
-          </a:xfrm>
-          <a:prstGeom prst="rect">
-            <a:avLst/>
-          </a:prstGeom>
-          <a:noFill/>
-          <a:ln>
-            <a:noFill/>
-          </a:ln>
-        </p:spPr>
-      </p:pic>
-      <p:sp>
-        <p:nvSpPr>
           <p:cNvPr id="139" name="Google Shape;139;p21"/>
-          <p:cNvSpPr txBox="1"/>
-          <p:nvPr/>
-        </p:nvSpPr>
-        <p:spPr>
-          <a:xfrm>
-            <a:off x="2957000" y="4835325"/>
-            <a:ext cx="2369400" cy="202200"/>
-          </a:xfrm>
-          <a:prstGeom prst="rect">
-            <a:avLst/>
-          </a:prstGeom>
-          <a:noFill/>
-          <a:ln>
-            <a:noFill/>
-          </a:ln>
-        </p:spPr>
-        <p:txBody>
-          <a:bodyPr anchorCtr="0" anchor="t" bIns="91425" lIns="91425" spcFirstLastPara="1" rIns="91425" wrap="square" tIns="91425">
-            <a:noAutofit/>
-          </a:bodyPr>
-          <a:lstStyle/>
-          <a:p>
-            <a:pPr indent="0" lvl="0" marL="0" rtl="0" algn="l">
-              <a:spcBef>
-                <a:spcPts val="0"/>
-              </a:spcBef>
-              <a:spcAft>
-                <a:spcPts val="0"/>
-              </a:spcAft>
-              <a:buNone/>
-            </a:pPr>
-            <a:r>
-              <a:rPr lang="en" sz="1200">
-                <a:solidFill>
-                  <a:schemeClr val="dk2"/>
-                </a:solidFill>
-              </a:rPr>
-              <a:t>J. J. Hopfield, 1984</a:t>
-            </a:r>
-            <a:endParaRPr sz="1200">
-              <a:solidFill>
-                <a:schemeClr val="dk2"/>
-              </a:solidFill>
-            </a:endParaRPr>
-          </a:p>
-        </p:txBody>
-      </p:sp>
-      <p:pic>
-        <p:nvPicPr>
-          <p:cNvPr id="140" name="Google Shape;140;p21"/>
           <p:cNvPicPr preferRelativeResize="0"/>
           <p:nvPr/>
         </p:nvPicPr>
@@ -11472,8 +11502,8 @@
         </p:blipFill>
         <p:spPr>
           <a:xfrm>
-            <a:off x="5419149" y="204643"/>
-            <a:ext cx="3605774" cy="4734219"/>
+            <a:off x="228325" y="972800"/>
+            <a:ext cx="3287701" cy="4064725"/>
           </a:xfrm>
           <a:prstGeom prst="rect">
             <a:avLst/>
@@ -11486,7 +11516,85 @@
       </p:pic>
       <p:sp>
         <p:nvSpPr>
+          <p:cNvPr id="140" name="Google Shape;140;p21"/>
+          <p:cNvSpPr txBox="1"/>
+          <p:nvPr/>
+        </p:nvSpPr>
+        <p:spPr>
+          <a:xfrm>
+            <a:off x="2957000" y="4835325"/>
+            <a:ext cx="2369400" cy="202200"/>
+          </a:xfrm>
+          <a:prstGeom prst="rect">
+            <a:avLst/>
+          </a:prstGeom>
+          <a:noFill/>
+          <a:ln>
+            <a:noFill/>
+          </a:ln>
+        </p:spPr>
+        <p:txBody>
+          <a:bodyPr anchorCtr="0" anchor="t" bIns="91425" lIns="91425" spcFirstLastPara="1" rIns="91425" wrap="square" tIns="91425">
+            <a:noAutofit/>
+          </a:bodyPr>
+          <a:lstStyle/>
+          <a:p>
+            <a:pPr indent="0" lvl="0" marL="0" rtl="0" algn="l">
+              <a:spcBef>
+                <a:spcPts val="0"/>
+              </a:spcBef>
+              <a:spcAft>
+                <a:spcPts val="0"/>
+              </a:spcAft>
+              <a:buNone/>
+            </a:pPr>
+            <a:r>
+              <a:rPr lang="en" sz="1200">
+                <a:solidFill>
+                  <a:schemeClr val="dk2"/>
+                </a:solidFill>
+              </a:rPr>
+              <a:t>J. J. Hopfield, 1984</a:t>
+            </a:r>
+            <a:endParaRPr sz="1200">
+              <a:solidFill>
+                <a:schemeClr val="dk2"/>
+              </a:solidFill>
+            </a:endParaRPr>
+          </a:p>
+        </p:txBody>
+      </p:sp>
+      <p:pic>
+        <p:nvPicPr>
           <p:cNvPr id="141" name="Google Shape;141;p21"/>
+          <p:cNvPicPr preferRelativeResize="0"/>
+          <p:nvPr/>
+        </p:nvPicPr>
+        <p:blipFill>
+          <a:blip r:embed="rId5">
+            <a:alphaModFix/>
+          </a:blip>
+          <a:stretch>
+            <a:fillRect/>
+          </a:stretch>
+        </p:blipFill>
+        <p:spPr>
+          <a:xfrm>
+            <a:off x="5419149" y="204643"/>
+            <a:ext cx="3605774" cy="4734219"/>
+          </a:xfrm>
+          <a:prstGeom prst="rect">
+            <a:avLst/>
+          </a:prstGeom>
+          <a:noFill/>
+          <a:ln>
+            <a:noFill/>
+          </a:ln>
+        </p:spPr>
+      </p:pic>
+      <p:sp>
+        <p:nvSpPr>
+          <p:cNvPr id="142" name="Google Shape;142;p21"/>
           <p:cNvSpPr/>
           <p:nvPr/>
         </p:nvSpPr>
@@ -11533,9 +11641,9 @@
       </p:sp>
       <p:cxnSp>
         <p:nvCxnSpPr>
-          <p:cNvPr id="142" name="Google Shape;142;p21"/>
+          <p:cNvPr id="143" name="Google Shape;143;p21"/>
           <p:cNvCxnSpPr>
-            <a:stCxn id="141" idx="3"/>
+            <a:stCxn id="142" idx="3"/>
           </p:cNvCxnSpPr>
           <p:nvPr/>
         </p:nvCxnSpPr>

</xml_diff>